<commit_message>
UI app done, latest ppt
</commit_message>
<xml_diff>
--- a/ppt/CodeCamp-AWS.pptx
+++ b/ppt/CodeCamp-AWS.pptx
@@ -10,7 +10,7 @@
     <p:sldId id="258" r:id="rId4"/>
     <p:sldId id="259" r:id="rId5"/>
     <p:sldId id="261" r:id="rId6"/>
-    <p:sldId id="262" r:id="rId7"/>
+    <p:sldId id="286" r:id="rId7"/>
     <p:sldId id="263" r:id="rId8"/>
     <p:sldId id="264" r:id="rId9"/>
     <p:sldId id="265" r:id="rId10"/>
@@ -5197,13 +5197,8 @@
           <a:p>
             <a:r>
               <a:rPr lang="en-US" dirty="0" smtClean="0"/>
-              <a:t>Docker in </a:t>
-            </a:r>
-            <a:r>
-              <a:rPr lang="en-US" dirty="0" smtClean="0"/>
-              <a:t>Azure </a:t>
-            </a:r>
-            <a:endParaRPr lang="en-US" dirty="0" smtClean="0"/>
+              <a:t>Docker in Azure </a:t>
+            </a:r>
           </a:p>
           <a:p>
             <a:r>
@@ -5216,7 +5211,6 @@
               <a:rPr lang="en-US" dirty="0" smtClean="0"/>
               <a:t>Exercise</a:t>
             </a:r>
-            <a:endParaRPr lang="en-US" dirty="0" smtClean="0"/>
           </a:p>
           <a:p>
             <a:endParaRPr lang="en-US" dirty="0" smtClean="0"/>
@@ -7573,6 +7567,13 @@
   <p:clrMapOvr>
     <a:masterClrMapping/>
   </p:clrMapOvr>
+  <p:timing>
+    <p:tnLst>
+      <p:par>
+        <p:cTn id="1" dur="indefinite" restart="never" nodeType="tmRoot"/>
+      </p:par>
+    </p:tnLst>
+  </p:timing>
 </p:sld>
 </file>
 
@@ -7606,7 +7607,7 @@
         <p:spPr>
           <a:xfrm>
             <a:off x="0" y="0"/>
-            <a:ext cx="11157856" cy="1325563"/>
+            <a:ext cx="11157856" cy="845389"/>
           </a:xfrm>
         </p:spPr>
         <p:txBody>
@@ -7615,7 +7616,7 @@
           <a:p>
             <a:r>
               <a:rPr lang="en-US" dirty="0" smtClean="0"/>
-              <a:t>Docker Basics</a:t>
+              <a:t>What is Docker?</a:t>
             </a:r>
             <a:endParaRPr lang="en-US" dirty="0"/>
           </a:p>
@@ -7633,26 +7634,16 @@
         </p:nvSpPr>
         <p:spPr>
           <a:xfrm>
-            <a:off x="144184" y="1325563"/>
-            <a:ext cx="11157857" cy="4351338"/>
+            <a:off x="0" y="782098"/>
+            <a:ext cx="11157857" cy="5532437"/>
           </a:xfrm>
         </p:spPr>
         <p:txBody>
-          <a:bodyPr/>
-          <a:lstStyle/>
-          <a:p>
-            <a:pPr marL="0" indent="0">
-              <a:buNone/>
-            </a:pPr>
-            <a:r>
-              <a:rPr lang="en-US" dirty="0" smtClean="0"/>
-              <a:t>What is Docker?</a:t>
-            </a:r>
-          </a:p>
-          <a:p>
-            <a:pPr marL="0" indent="0">
-              <a:buNone/>
-            </a:pPr>
+          <a:bodyPr>
+            <a:normAutofit/>
+          </a:bodyPr>
+          <a:lstStyle/>
+          <a:p>
             <a:r>
               <a:rPr lang="en-US" sz="1800" dirty="0"/>
               <a:t>Docker is a software technology providing </a:t>
@@ -7675,67 +7666,84 @@
             </a:r>
             <a:r>
               <a:rPr lang="en-US" sz="1800" dirty="0"/>
-              <a:t> on Windows and Linux</a:t>
+              <a:t> on Windows and </a:t>
             </a:r>
             <a:r>
               <a:rPr lang="en-US" sz="1800" dirty="0" smtClean="0"/>
-              <a:t>.</a:t>
-            </a:r>
-            <a:r>
-              <a:rPr lang="en-US" sz="1800" dirty="0"/>
-              <a:t> Docker uses the resource isolation features of the Linux kernel such as </a:t>
-            </a:r>
-            <a:r>
-              <a:rPr lang="en-US" sz="1800" dirty="0" err="1">
-                <a:hlinkClick r:id="rId3" tooltip="Cgroups"/>
-              </a:rPr>
+              <a:t>Linux.</a:t>
+            </a:r>
+          </a:p>
+          <a:p>
+            <a:r>
+              <a:rPr lang="en-US" sz="1800" dirty="0" smtClean="0"/>
+              <a:t>Containers will provide process isolation, file system isolation, network isolation, CPU/Memory quotas, i/o rate limiting to the applications running in container.</a:t>
+            </a:r>
+          </a:p>
+          <a:p>
+            <a:pPr lvl="1"/>
+            <a:r>
+              <a:rPr lang="en-US" sz="1600" dirty="0" smtClean="0"/>
+              <a:t>On </a:t>
+            </a:r>
+            <a:r>
+              <a:rPr lang="en-US" sz="1600" dirty="0" err="1" smtClean="0"/>
+              <a:t>linux</a:t>
+            </a:r>
+            <a:r>
+              <a:rPr lang="en-US" sz="1600" dirty="0" smtClean="0"/>
+              <a:t> it </a:t>
+            </a:r>
+            <a:r>
+              <a:rPr lang="en-US" sz="1600" dirty="0"/>
+              <a:t>u</a:t>
+            </a:r>
+            <a:r>
+              <a:rPr lang="en-US" sz="1600" dirty="0" smtClean="0"/>
+              <a:t>ses </a:t>
+            </a:r>
+            <a:r>
+              <a:rPr lang="en-US" sz="1600" dirty="0" err="1" smtClean="0"/>
+              <a:t>runc</a:t>
+            </a:r>
+            <a:r>
+              <a:rPr lang="en-US" sz="1600" dirty="0" smtClean="0"/>
+              <a:t>, </a:t>
+            </a:r>
+            <a:r>
+              <a:rPr lang="en-US" sz="1800" dirty="0" err="1" smtClean="0"/>
+              <a:t>containerd</a:t>
+            </a:r>
+            <a:r>
+              <a:rPr lang="en-US" sz="1600" dirty="0" smtClean="0"/>
+              <a:t>, </a:t>
+            </a:r>
+            <a:r>
+              <a:rPr lang="en-US" sz="1600" dirty="0" err="1" smtClean="0"/>
               <a:t>cgroups</a:t>
             </a:r>
             <a:r>
-              <a:rPr lang="en-US" sz="1800" dirty="0"/>
-              <a:t> and kernel </a:t>
-            </a:r>
-            <a:r>
-              <a:rPr lang="en-US" sz="1800" dirty="0">
-                <a:hlinkClick r:id="rId4" tooltip="Linux namespaces"/>
-              </a:rPr>
-              <a:t>namespaces</a:t>
-            </a:r>
-            <a:r>
-              <a:rPr lang="en-US" sz="1800" dirty="0"/>
-              <a:t>, and a </a:t>
-            </a:r>
-            <a:r>
-              <a:rPr lang="en-US" sz="1800" dirty="0">
-                <a:hlinkClick r:id="rId5" tooltip="Union mount"/>
-              </a:rPr>
-              <a:t>union-capable file system</a:t>
-            </a:r>
-            <a:r>
-              <a:rPr lang="en-US" sz="1800" dirty="0"/>
-              <a:t> such as </a:t>
-            </a:r>
-            <a:r>
-              <a:rPr lang="en-US" sz="1800" dirty="0" err="1">
-                <a:hlinkClick r:id="rId6" tooltip="OverlayFS"/>
-              </a:rPr>
-              <a:t>OverlayFS</a:t>
-            </a:r>
-            <a:r>
-              <a:rPr lang="en-US" sz="1800" dirty="0"/>
-              <a:t> and </a:t>
-            </a:r>
+              <a:rPr lang="en-US" sz="1600" dirty="0" smtClean="0"/>
+              <a:t>, namespaces and layered file system of host OS kernel to achieve isolation</a:t>
+            </a:r>
+            <a:endParaRPr lang="en-US" sz="1400" dirty="0" smtClean="0"/>
+          </a:p>
+          <a:p>
+            <a:pPr lvl="1"/>
+            <a:r>
+              <a:rPr lang="en-US" sz="1600" dirty="0" smtClean="0"/>
+              <a:t>On windows it uses job objects, object namespace and union file system extensions.</a:t>
+            </a:r>
+          </a:p>
+          <a:p>
             <a:r>
               <a:rPr lang="en-US" sz="1800" dirty="0" smtClean="0"/>
-              <a:t>others</a:t>
-            </a:r>
-            <a:r>
-              <a:rPr lang="en-US" sz="1800" dirty="0"/>
-              <a:t> to allow independent "containers" to run within a single Linux instance, avoiding the overhead of starting and maintaining virtual </a:t>
-            </a:r>
+              <a:t>Not full isolation unlike VM. Containers do share Host OS kernel. i.e. provides user space/mode isolation not kernel space/mode.</a:t>
+            </a:r>
+          </a:p>
+          <a:p>
             <a:r>
               <a:rPr lang="en-US" sz="1800" dirty="0" smtClean="0"/>
-              <a:t>machines.</a:t>
+              <a:t>Windows supports Hyper-V containers(light weight Hyper-V VM with kernel) which provides full isolation.</a:t>
             </a:r>
           </a:p>
           <a:p>
@@ -7755,7 +7763,7 @@
           <p:nvPr/>
         </p:nvPicPr>
         <p:blipFill>
-          <a:blip r:embed="rId7">
+          <a:blip r:embed="rId3">
             <a:extLst>
               <a:ext uri="{28A0092B-C50C-407E-A947-70E740481C1C}">
                 <a14:useLocalDpi xmlns:a14="http://schemas.microsoft.com/office/drawing/2010/main" val="0"/>
@@ -7769,8 +7777,8 @@
         </p:blipFill>
         <p:spPr bwMode="auto">
           <a:xfrm>
-            <a:off x="2173342" y="2894323"/>
-            <a:ext cx="7099540" cy="3834281"/>
+            <a:off x="2700230" y="3355676"/>
+            <a:ext cx="6277247" cy="3390182"/>
           </a:xfrm>
           <a:prstGeom prst="rect">
             <a:avLst/>
@@ -7790,13 +7798,20 @@
     </p:spTree>
     <p:extLst>
       <p:ext uri="{BB962C8B-B14F-4D97-AF65-F5344CB8AC3E}">
-        <p14:creationId xmlns:p14="http://schemas.microsoft.com/office/powerpoint/2010/main" val="520170236"/>
+        <p14:creationId xmlns:p14="http://schemas.microsoft.com/office/powerpoint/2010/main" val="2006945537"/>
       </p:ext>
     </p:extLst>
   </p:cSld>
   <p:clrMapOvr>
     <a:masterClrMapping/>
   </p:clrMapOvr>
+  <p:timing>
+    <p:tnLst>
+      <p:par>
+        <p:cTn id="1" dur="indefinite" restart="never" nodeType="tmRoot"/>
+      </p:par>
+    </p:tnLst>
+  </p:timing>
 </p:sld>
 </file>
 
@@ -7868,7 +7883,7 @@
         </p:blipFill>
         <p:spPr bwMode="auto">
           <a:xfrm>
-            <a:off x="215660" y="1994233"/>
+            <a:off x="0" y="3122761"/>
             <a:ext cx="5263371" cy="3735239"/>
           </a:xfrm>
           <a:prstGeom prst="rect">
@@ -7909,7 +7924,7 @@
         </p:blipFill>
         <p:spPr bwMode="auto">
           <a:xfrm>
-            <a:off x="4873924" y="1994233"/>
+            <a:off x="5011947" y="3122760"/>
             <a:ext cx="6010035" cy="3735239"/>
           </a:xfrm>
           <a:prstGeom prst="rect">
@@ -7927,6 +7942,247 @@
           </a:extLst>
         </p:spPr>
       </p:pic>
+      <p:sp>
+        <p:nvSpPr>
+          <p:cNvPr id="6" name="Content Placeholder 2"/>
+          <p:cNvSpPr>
+            <a:spLocks noGrp="1"/>
+          </p:cNvSpPr>
+          <p:nvPr>
+            <p:ph idx="1"/>
+          </p:nvPr>
+        </p:nvSpPr>
+        <p:spPr>
+          <a:xfrm>
+            <a:off x="144185" y="1325563"/>
+            <a:ext cx="4647272" cy="1637093"/>
+          </a:xfrm>
+        </p:spPr>
+        <p:txBody>
+          <a:bodyPr>
+            <a:normAutofit/>
+          </a:bodyPr>
+          <a:lstStyle/>
+          <a:p>
+            <a:pPr marL="0" indent="0">
+              <a:buNone/>
+            </a:pPr>
+            <a:r>
+              <a:rPr lang="en-US" dirty="0" smtClean="0"/>
+              <a:t>. Windows server 2016 and windows 10  with anniversary update.</a:t>
+            </a:r>
+            <a:endParaRPr lang="en-US" dirty="0"/>
+          </a:p>
+        </p:txBody>
+      </p:sp>
+      <p:sp>
+        <p:nvSpPr>
+          <p:cNvPr id="7" name="Content Placeholder 2"/>
+          <p:cNvSpPr txBox="1">
+            <a:spLocks/>
+          </p:cNvSpPr>
+          <p:nvPr/>
+        </p:nvSpPr>
+        <p:spPr>
+          <a:xfrm>
+            <a:off x="5578928" y="1325563"/>
+            <a:ext cx="4647272" cy="1637093"/>
+          </a:xfrm>
+          <a:prstGeom prst="rect">
+            <a:avLst/>
+          </a:prstGeom>
+        </p:spPr>
+        <p:txBody>
+          <a:bodyPr vert="horz" lIns="91440" tIns="45720" rIns="91440" bIns="45720" rtlCol="0">
+            <a:normAutofit/>
+          </a:bodyPr>
+          <a:lstStyle>
+            <a:lvl1pPr marL="228600" indent="-228600" algn="l" defTabSz="914400" rtl="0" eaLnBrk="1" latinLnBrk="0" hangingPunct="1">
+              <a:lnSpc>
+                <a:spcPct val="90000"/>
+              </a:lnSpc>
+              <a:spcBef>
+                <a:spcPts val="1000"/>
+              </a:spcBef>
+              <a:buFont typeface="Arial" panose="020B0604020202020204" pitchFamily="34" charset="0"/>
+              <a:buChar char="•"/>
+              <a:defRPr sz="2800" kern="1200">
+                <a:solidFill>
+                  <a:schemeClr val="tx2">
+                    <a:lumMod val="75000"/>
+                  </a:schemeClr>
+                </a:solidFill>
+                <a:latin typeface="Buxton Sketch" panose="03080500000500000004" pitchFamily="66" charset="0"/>
+                <a:ea typeface="Segoe UI Historic" panose="020B0502040204020203" pitchFamily="34" charset="0"/>
+                <a:cs typeface="Segoe UI Historic" panose="020B0502040204020203" pitchFamily="34" charset="0"/>
+              </a:defRPr>
+            </a:lvl1pPr>
+            <a:lvl2pPr marL="685800" indent="-228600" algn="l" defTabSz="914400" rtl="0" eaLnBrk="1" latinLnBrk="0" hangingPunct="1">
+              <a:lnSpc>
+                <a:spcPct val="90000"/>
+              </a:lnSpc>
+              <a:spcBef>
+                <a:spcPts val="500"/>
+              </a:spcBef>
+              <a:buFont typeface="Arial" panose="020B0604020202020204" pitchFamily="34" charset="0"/>
+              <a:buChar char="•"/>
+              <a:defRPr sz="2400" kern="1200">
+                <a:solidFill>
+                  <a:schemeClr val="tx2">
+                    <a:lumMod val="75000"/>
+                  </a:schemeClr>
+                </a:solidFill>
+                <a:latin typeface="Buxton Sketch" panose="03080500000500000004" pitchFamily="66" charset="0"/>
+                <a:ea typeface="Segoe UI Historic" panose="020B0502040204020203" pitchFamily="34" charset="0"/>
+                <a:cs typeface="Segoe UI Historic" panose="020B0502040204020203" pitchFamily="34" charset="0"/>
+              </a:defRPr>
+            </a:lvl2pPr>
+            <a:lvl3pPr marL="1143000" indent="-228600" algn="l" defTabSz="914400" rtl="0" eaLnBrk="1" latinLnBrk="0" hangingPunct="1">
+              <a:lnSpc>
+                <a:spcPct val="90000"/>
+              </a:lnSpc>
+              <a:spcBef>
+                <a:spcPts val="500"/>
+              </a:spcBef>
+              <a:buFont typeface="Arial" panose="020B0604020202020204" pitchFamily="34" charset="0"/>
+              <a:buChar char="•"/>
+              <a:defRPr sz="2000" kern="1200">
+                <a:solidFill>
+                  <a:schemeClr val="tx2">
+                    <a:lumMod val="75000"/>
+                  </a:schemeClr>
+                </a:solidFill>
+                <a:latin typeface="Buxton Sketch" panose="03080500000500000004" pitchFamily="66" charset="0"/>
+                <a:ea typeface="Segoe UI Historic" panose="020B0502040204020203" pitchFamily="34" charset="0"/>
+                <a:cs typeface="Segoe UI Historic" panose="020B0502040204020203" pitchFamily="34" charset="0"/>
+              </a:defRPr>
+            </a:lvl3pPr>
+            <a:lvl4pPr marL="1600200" indent="-228600" algn="l" defTabSz="914400" rtl="0" eaLnBrk="1" latinLnBrk="0" hangingPunct="1">
+              <a:lnSpc>
+                <a:spcPct val="90000"/>
+              </a:lnSpc>
+              <a:spcBef>
+                <a:spcPts val="500"/>
+              </a:spcBef>
+              <a:buFont typeface="Arial" panose="020B0604020202020204" pitchFamily="34" charset="0"/>
+              <a:buChar char="•"/>
+              <a:defRPr sz="1800" kern="1200">
+                <a:solidFill>
+                  <a:schemeClr val="tx2">
+                    <a:lumMod val="75000"/>
+                  </a:schemeClr>
+                </a:solidFill>
+                <a:latin typeface="Buxton Sketch" panose="03080500000500000004" pitchFamily="66" charset="0"/>
+                <a:ea typeface="Segoe UI Historic" panose="020B0502040204020203" pitchFamily="34" charset="0"/>
+                <a:cs typeface="Segoe UI Historic" panose="020B0502040204020203" pitchFamily="34" charset="0"/>
+              </a:defRPr>
+            </a:lvl4pPr>
+            <a:lvl5pPr marL="2057400" indent="-228600" algn="l" defTabSz="914400" rtl="0" eaLnBrk="1" latinLnBrk="0" hangingPunct="1">
+              <a:lnSpc>
+                <a:spcPct val="90000"/>
+              </a:lnSpc>
+              <a:spcBef>
+                <a:spcPts val="500"/>
+              </a:spcBef>
+              <a:buFont typeface="Arial" panose="020B0604020202020204" pitchFamily="34" charset="0"/>
+              <a:buChar char="•"/>
+              <a:defRPr sz="1800" kern="1200">
+                <a:solidFill>
+                  <a:schemeClr val="tx2">
+                    <a:lumMod val="75000"/>
+                  </a:schemeClr>
+                </a:solidFill>
+                <a:latin typeface="Buxton Sketch" panose="03080500000500000004" pitchFamily="66" charset="0"/>
+                <a:ea typeface="Segoe UI Historic" panose="020B0502040204020203" pitchFamily="34" charset="0"/>
+                <a:cs typeface="Segoe UI Historic" panose="020B0502040204020203" pitchFamily="34" charset="0"/>
+              </a:defRPr>
+            </a:lvl5pPr>
+            <a:lvl6pPr marL="2514600" indent="-228600" algn="l" defTabSz="914400" rtl="0" eaLnBrk="1" latinLnBrk="0" hangingPunct="1">
+              <a:lnSpc>
+                <a:spcPct val="90000"/>
+              </a:lnSpc>
+              <a:spcBef>
+                <a:spcPts val="500"/>
+              </a:spcBef>
+              <a:buFont typeface="Arial" panose="020B0604020202020204" pitchFamily="34" charset="0"/>
+              <a:buChar char="•"/>
+              <a:defRPr sz="1800" kern="1200">
+                <a:solidFill>
+                  <a:schemeClr val="tx1"/>
+                </a:solidFill>
+                <a:latin typeface="+mn-lt"/>
+                <a:ea typeface="+mn-ea"/>
+                <a:cs typeface="+mn-cs"/>
+              </a:defRPr>
+            </a:lvl6pPr>
+            <a:lvl7pPr marL="2971800" indent="-228600" algn="l" defTabSz="914400" rtl="0" eaLnBrk="1" latinLnBrk="0" hangingPunct="1">
+              <a:lnSpc>
+                <a:spcPct val="90000"/>
+              </a:lnSpc>
+              <a:spcBef>
+                <a:spcPts val="500"/>
+              </a:spcBef>
+              <a:buFont typeface="Arial" panose="020B0604020202020204" pitchFamily="34" charset="0"/>
+              <a:buChar char="•"/>
+              <a:defRPr sz="1800" kern="1200">
+                <a:solidFill>
+                  <a:schemeClr val="tx1"/>
+                </a:solidFill>
+                <a:latin typeface="+mn-lt"/>
+                <a:ea typeface="+mn-ea"/>
+                <a:cs typeface="+mn-cs"/>
+              </a:defRPr>
+            </a:lvl7pPr>
+            <a:lvl8pPr marL="3429000" indent="-228600" algn="l" defTabSz="914400" rtl="0" eaLnBrk="1" latinLnBrk="0" hangingPunct="1">
+              <a:lnSpc>
+                <a:spcPct val="90000"/>
+              </a:lnSpc>
+              <a:spcBef>
+                <a:spcPts val="500"/>
+              </a:spcBef>
+              <a:buFont typeface="Arial" panose="020B0604020202020204" pitchFamily="34" charset="0"/>
+              <a:buChar char="•"/>
+              <a:defRPr sz="1800" kern="1200">
+                <a:solidFill>
+                  <a:schemeClr val="tx1"/>
+                </a:solidFill>
+                <a:latin typeface="+mn-lt"/>
+                <a:ea typeface="+mn-ea"/>
+                <a:cs typeface="+mn-cs"/>
+              </a:defRPr>
+            </a:lvl8pPr>
+            <a:lvl9pPr marL="3886200" indent="-228600" algn="l" defTabSz="914400" rtl="0" eaLnBrk="1" latinLnBrk="0" hangingPunct="1">
+              <a:lnSpc>
+                <a:spcPct val="90000"/>
+              </a:lnSpc>
+              <a:spcBef>
+                <a:spcPts val="500"/>
+              </a:spcBef>
+              <a:buFont typeface="Arial" panose="020B0604020202020204" pitchFamily="34" charset="0"/>
+              <a:buChar char="•"/>
+              <a:defRPr sz="1800" kern="1200">
+                <a:solidFill>
+                  <a:schemeClr val="tx1"/>
+                </a:solidFill>
+                <a:latin typeface="+mn-lt"/>
+                <a:ea typeface="+mn-ea"/>
+                <a:cs typeface="+mn-cs"/>
+              </a:defRPr>
+            </a:lvl9pPr>
+          </a:lstStyle>
+          <a:p>
+            <a:pPr marL="0" indent="0">
+              <a:buFont typeface="Arial" panose="020B0604020202020204" pitchFamily="34" charset="0"/>
+              <a:buNone/>
+            </a:pPr>
+            <a:r>
+              <a:rPr lang="en-US" dirty="0" smtClean="0"/>
+              <a:t>. All modern Linux distros</a:t>
+            </a:r>
+            <a:endParaRPr lang="en-US" dirty="0"/>
+          </a:p>
+        </p:txBody>
+      </p:sp>
     </p:spTree>
     <p:extLst>
       <p:ext uri="{BB962C8B-B14F-4D97-AF65-F5344CB8AC3E}">
@@ -7937,6 +8193,13 @@
   <p:clrMapOvr>
     <a:masterClrMapping/>
   </p:clrMapOvr>
+  <p:timing>
+    <p:tnLst>
+      <p:par>
+        <p:cTn id="1" dur="indefinite" restart="never" nodeType="tmRoot"/>
+      </p:par>
+    </p:tnLst>
+  </p:timing>
 </p:sld>
 </file>
 
@@ -7969,8 +8232,8 @@
         </p:nvSpPr>
         <p:spPr>
           <a:xfrm>
-            <a:off x="0" y="0"/>
-            <a:ext cx="11157856" cy="1325563"/>
+            <a:off x="0" y="1"/>
+            <a:ext cx="11157856" cy="1042416"/>
           </a:xfrm>
         </p:spPr>
         <p:txBody>
@@ -7997,26 +8260,39 @@
         </p:nvSpPr>
         <p:spPr>
           <a:xfrm>
-            <a:off x="144184" y="1325563"/>
-            <a:ext cx="11157857" cy="4932624"/>
+            <a:off x="107608" y="1042417"/>
+            <a:ext cx="11157857" cy="5331269"/>
           </a:xfrm>
         </p:spPr>
         <p:txBody>
           <a:bodyPr>
-            <a:normAutofit lnSpcReduction="10000"/>
+            <a:normAutofit fontScale="92500" lnSpcReduction="20000"/>
           </a:bodyPr>
           <a:lstStyle/>
           <a:p>
             <a:r>
               <a:rPr lang="en-US" dirty="0" smtClean="0"/>
-              <a:t>Isolation</a:t>
-            </a:r>
+              <a:t>Application centric</a:t>
+            </a:r>
+            <a:endParaRPr lang="en-US" dirty="0" smtClean="0"/>
           </a:p>
           <a:p>
             <a:pPr lvl="1"/>
             <a:r>
-              <a:rPr lang="en-US" dirty="0" smtClean="0"/>
-              <a:t>Network, file system, registry, process , CPU and memory</a:t>
+              <a:rPr lang="en-US" dirty="0"/>
+              <a:t>Docker is </a:t>
+            </a:r>
+            <a:r>
+              <a:rPr lang="en-US" dirty="0" smtClean="0"/>
+              <a:t>optimized </a:t>
+            </a:r>
+            <a:r>
+              <a:rPr lang="en-US" dirty="0"/>
+              <a:t>for the deployment of applications, as opposed to </a:t>
+            </a:r>
+            <a:r>
+              <a:rPr lang="en-US" dirty="0" smtClean="0"/>
+              <a:t>machines.</a:t>
             </a:r>
             <a:endParaRPr lang="en-US" dirty="0" smtClean="0"/>
           </a:p>
@@ -8030,7 +8306,23 @@
             <a:pPr lvl="1"/>
             <a:r>
               <a:rPr lang="en-US" dirty="0" smtClean="0"/>
-              <a:t>Abstracted the complex virtual environment entities in OS and kernel with simple API.</a:t>
+              <a:t>Abstracted the complex </a:t>
+            </a:r>
+            <a:r>
+              <a:rPr lang="en-US" dirty="0" smtClean="0"/>
+              <a:t>OS level virtual </a:t>
+            </a:r>
+            <a:r>
+              <a:rPr lang="en-US" dirty="0" smtClean="0"/>
+              <a:t>environment entities in </a:t>
+            </a:r>
+            <a:r>
+              <a:rPr lang="en-US" dirty="0" smtClean="0"/>
+              <a:t>Host OS kernel </a:t>
+            </a:r>
+            <a:r>
+              <a:rPr lang="en-US" dirty="0" smtClean="0"/>
+              <a:t>with simple API.</a:t>
             </a:r>
           </a:p>
           <a:p>
@@ -8040,27 +8332,45 @@
               <a:t>Same API across platforms – </a:t>
             </a:r>
             <a:r>
+              <a:rPr lang="en-US" dirty="0" smtClean="0"/>
+              <a:t>Linux</a:t>
+            </a:r>
+            <a:r>
               <a:rPr lang="en-US" dirty="0"/>
-              <a:t>L</a:t>
-            </a:r>
-            <a:r>
-              <a:rPr lang="en-US" dirty="0" smtClean="0"/>
-              <a:t>inux, Windows and MAC.</a:t>
+              <a:t> </a:t>
+            </a:r>
+            <a:r>
+              <a:rPr lang="en-US" dirty="0" smtClean="0"/>
+              <a:t>and</a:t>
+            </a:r>
+            <a:r>
+              <a:rPr lang="en-US" dirty="0" smtClean="0"/>
+              <a:t> Windows.</a:t>
             </a:r>
             <a:endParaRPr lang="en-US" dirty="0" smtClean="0"/>
           </a:p>
           <a:p>
             <a:r>
-              <a:rPr lang="en-US" dirty="0" smtClean="0"/>
-              <a:t>Lightweight</a:t>
-            </a:r>
+              <a:rPr lang="en-US" dirty="0"/>
+              <a:t>Portable </a:t>
+            </a:r>
+            <a:r>
+              <a:rPr lang="en-US" dirty="0" smtClean="0"/>
+              <a:t>applications</a:t>
+            </a:r>
+            <a:endParaRPr lang="en-US" dirty="0"/>
           </a:p>
           <a:p>
             <a:pPr lvl="1"/>
             <a:r>
-              <a:rPr lang="en-US" dirty="0" smtClean="0"/>
-              <a:t>Fast boot up time, can deploy apps at high density.</a:t>
-            </a:r>
+              <a:rPr lang="en-US" dirty="0"/>
+              <a:t>Docker defines a format for bundling an application and all its dependencies into a single object called a </a:t>
+            </a:r>
+            <a:r>
+              <a:rPr lang="en-US" dirty="0" smtClean="0"/>
+              <a:t>container – thru image files.</a:t>
+            </a:r>
+            <a:endParaRPr lang="en-US" dirty="0" smtClean="0"/>
           </a:p>
           <a:p>
             <a:pPr lvl="1"/>
@@ -8075,26 +8385,56 @@
               <a:rPr lang="en-US" dirty="0" smtClean="0"/>
               <a:t>Ideal for micro services.</a:t>
             </a:r>
+          </a:p>
+          <a:p>
+            <a:r>
+              <a:rPr lang="en-US" dirty="0" smtClean="0"/>
+              <a:t>Community</a:t>
+            </a:r>
+          </a:p>
+          <a:p>
+            <a:pPr lvl="1"/>
+            <a:r>
+              <a:rPr lang="en-US" dirty="0" smtClean="0"/>
+              <a:t>Hundreds </a:t>
+            </a:r>
+            <a:r>
+              <a:rPr lang="en-US" dirty="0" smtClean="0"/>
+              <a:t>of ready made open source base images in central repository</a:t>
+            </a:r>
+            <a:r>
+              <a:rPr lang="en-US" dirty="0" smtClean="0"/>
+              <a:t>.(always use official images or scan for vulnerabilities)</a:t>
+            </a:r>
             <a:endParaRPr lang="en-US" dirty="0" smtClean="0"/>
           </a:p>
           <a:p>
             <a:r>
               <a:rPr lang="en-US" dirty="0" smtClean="0"/>
-              <a:t>Community</a:t>
+              <a:t>Build once deploy </a:t>
+            </a:r>
+            <a:r>
+              <a:rPr lang="en-US" dirty="0" smtClean="0"/>
+              <a:t>anywhere ( Docker enabled machine)</a:t>
             </a:r>
           </a:p>
           <a:p>
             <a:pPr lvl="1"/>
             <a:r>
-              <a:rPr lang="en-US" dirty="0" smtClean="0"/>
-              <a:t>Thousands of ready made open source base images in central repository.</a:t>
-            </a:r>
-            <a:endParaRPr lang="en-US" dirty="0" smtClean="0"/>
-          </a:p>
-          <a:p>
-            <a:r>
-              <a:rPr lang="en-US" dirty="0" smtClean="0"/>
-              <a:t>Build once deploy anywhere</a:t>
+              <a:rPr lang="en-US" dirty="0"/>
+              <a:t>Deploying a consistent </a:t>
+            </a:r>
+            <a:r>
+              <a:rPr lang="en-US" dirty="0" smtClean="0"/>
+              <a:t>production/XX </a:t>
+            </a:r>
+            <a:r>
+              <a:rPr lang="en-US" dirty="0"/>
+              <a:t>environment is </a:t>
+            </a:r>
+            <a:r>
+              <a:rPr lang="en-US" dirty="0" smtClean="0"/>
+              <a:t>easier.</a:t>
             </a:r>
             <a:endParaRPr lang="en-US" dirty="0"/>
           </a:p>

</xml_diff>